<commit_message>
modify: add info about the bar chart
</commit_message>
<xml_diff>
--- a/report/200714_WPCN.pptx
+++ b/report/200714_WPCN.pptx
@@ -5,7 +5,7 @@
     <p:sldMasterId id="2147483648" r:id="rId1"/>
   </p:sldMasterIdLst>
   <p:notesMasterIdLst>
-    <p:notesMasterId r:id="rId22"/>
+    <p:notesMasterId r:id="rId23"/>
   </p:notesMasterIdLst>
   <p:sldIdLst>
     <p:sldId id="256" r:id="rId2"/>
@@ -21,13 +21,14 @@
     <p:sldId id="374" r:id="rId12"/>
     <p:sldId id="375" r:id="rId13"/>
     <p:sldId id="376" r:id="rId14"/>
-    <p:sldId id="377" r:id="rId15"/>
-    <p:sldId id="367" r:id="rId16"/>
-    <p:sldId id="378" r:id="rId17"/>
-    <p:sldId id="368" r:id="rId18"/>
-    <p:sldId id="379" r:id="rId19"/>
-    <p:sldId id="363" r:id="rId20"/>
-    <p:sldId id="339" r:id="rId21"/>
+    <p:sldId id="380" r:id="rId15"/>
+    <p:sldId id="377" r:id="rId16"/>
+    <p:sldId id="367" r:id="rId17"/>
+    <p:sldId id="378" r:id="rId18"/>
+    <p:sldId id="368" r:id="rId19"/>
+    <p:sldId id="379" r:id="rId20"/>
+    <p:sldId id="363" r:id="rId21"/>
+    <p:sldId id="339" r:id="rId22"/>
   </p:sldIdLst>
   <p:sldSz cx="13004800" cy="9753600"/>
   <p:notesSz cx="6858000" cy="9144000"/>
@@ -1317,7 +1318,7 @@
           </a:ln>
           <a:extLst>
             <a:ext uri="{C572A759-6A51-4108-AA02-DFA0A04FC94B}">
-              <ma14:wrappingTextBoxFlag xmlns:ma14="http://schemas.microsoft.com/office/mac/drawingml/2011/main" xmlns:a14="http://schemas.microsoft.com/office/drawing/2010/main" xmlns:m="http://schemas.openxmlformats.org/officeDocument/2006/math" xmlns="" val="1"/>
+              <ma14:wrappingTextBoxFlag xmlns="" xmlns:m="http://schemas.openxmlformats.org/officeDocument/2006/math" xmlns:a14="http://schemas.microsoft.com/office/drawing/2010/main" xmlns:ma14="http://schemas.microsoft.com/office/mac/drawingml/2011/main" val="1"/>
             </a:ext>
           </a:extLst>
         </p:spPr>
@@ -1986,7 +1987,7 @@
           </a:ln>
           <a:extLst>
             <a:ext uri="{C572A759-6A51-4108-AA02-DFA0A04FC94B}">
-              <ma14:wrappingTextBoxFlag xmlns:ma14="http://schemas.microsoft.com/office/mac/drawingml/2011/main" xmlns:a14="http://schemas.microsoft.com/office/drawing/2010/main" xmlns:m="http://schemas.openxmlformats.org/officeDocument/2006/math" xmlns="" val="1"/>
+              <ma14:wrappingTextBoxFlag xmlns="" xmlns:m="http://schemas.openxmlformats.org/officeDocument/2006/math" xmlns:a14="http://schemas.microsoft.com/office/drawing/2010/main" xmlns:ma14="http://schemas.microsoft.com/office/mac/drawingml/2011/main" val="1"/>
             </a:ext>
           </a:extLst>
         </p:spPr>
@@ -2224,7 +2225,7 @@
           </a:ln>
           <a:extLst>
             <a:ext uri="{C572A759-6A51-4108-AA02-DFA0A04FC94B}">
-              <ma14:wrappingTextBoxFlag xmlns:ma14="http://schemas.microsoft.com/office/mac/drawingml/2011/main" xmlns:a14="http://schemas.microsoft.com/office/drawing/2010/main" xmlns:m="http://schemas.openxmlformats.org/officeDocument/2006/math" xmlns="" val="1"/>
+              <ma14:wrappingTextBoxFlag xmlns="" xmlns:m="http://schemas.openxmlformats.org/officeDocument/2006/math" xmlns:a14="http://schemas.microsoft.com/office/drawing/2010/main" xmlns:ma14="http://schemas.microsoft.com/office/mac/drawingml/2011/main" val="1"/>
             </a:ext>
           </a:extLst>
         </p:spPr>
@@ -2366,7 +2367,7 @@
           </a:ln>
           <a:extLst>
             <a:ext uri="{C572A759-6A51-4108-AA02-DFA0A04FC94B}">
-              <ma14:wrappingTextBoxFlag xmlns:ma14="http://schemas.microsoft.com/office/mac/drawingml/2011/main" xmlns:a14="http://schemas.microsoft.com/office/drawing/2010/main" xmlns:m="http://schemas.openxmlformats.org/officeDocument/2006/math" xmlns="" val="1"/>
+              <ma14:wrappingTextBoxFlag xmlns="" xmlns:m="http://schemas.openxmlformats.org/officeDocument/2006/math" xmlns:a14="http://schemas.microsoft.com/office/drawing/2010/main" xmlns:ma14="http://schemas.microsoft.com/office/mac/drawingml/2011/main" val="1"/>
             </a:ext>
           </a:extLst>
         </p:spPr>
@@ -2405,7 +2406,7 @@
           </a:ln>
           <a:extLst>
             <a:ext uri="{C572A759-6A51-4108-AA02-DFA0A04FC94B}">
-              <ma14:wrappingTextBoxFlag xmlns:ma14="http://schemas.microsoft.com/office/mac/drawingml/2011/main" xmlns:a14="http://schemas.microsoft.com/office/drawing/2010/main" xmlns:m="http://schemas.openxmlformats.org/officeDocument/2006/math" xmlns="" val="1"/>
+              <ma14:wrappingTextBoxFlag xmlns="" xmlns:m="http://schemas.openxmlformats.org/officeDocument/2006/math" xmlns:a14="http://schemas.microsoft.com/office/drawing/2010/main" xmlns:ma14="http://schemas.microsoft.com/office/mac/drawingml/2011/main" val="1"/>
             </a:ext>
           </a:extLst>
         </p:spPr>
@@ -3538,11 +3539,7 @@
             </a:pPr>
             <a:r>
               <a:rPr lang="ko-KR" altLang="en-US" dirty="0" smtClean="0"/>
-              <a:t>논문 수정 사항 </a:t>
-            </a:r>
-            <a:r>
-              <a:rPr lang="ko-KR" altLang="en-US" dirty="0" smtClean="0"/>
-              <a:t>정리</a:t>
+              <a:t>논문 수정 사항 정리</a:t>
             </a:r>
             <a:endParaRPr lang="en-US" altLang="ko-KR" dirty="0" smtClean="0"/>
           </a:p>
@@ -3649,7 +3646,7 @@
           </a:prstGeom>
           <a:extLst>
             <a:ext uri="{C572A759-6A51-4108-AA02-DFA0A04FC94B}">
-              <ma14:wrappingTextBoxFlag xmlns:ma14="http://schemas.microsoft.com/office/mac/drawingml/2011/main" xmlns:a14="http://schemas.microsoft.com/office/drawing/2010/main" xmlns:m="http://schemas.openxmlformats.org/officeDocument/2006/math" xmlns="" val="1"/>
+              <ma14:wrappingTextBoxFlag xmlns="" xmlns:m="http://schemas.openxmlformats.org/officeDocument/2006/math" xmlns:a14="http://schemas.microsoft.com/office/drawing/2010/main" xmlns:ma14="http://schemas.microsoft.com/office/mac/drawingml/2011/main" val="1"/>
             </a:ext>
           </a:extLst>
         </p:spPr>
@@ -3859,11 +3856,7 @@
             </a:pPr>
             <a:r>
               <a:rPr lang="ko-KR" altLang="en-US" dirty="0" smtClean="0"/>
-              <a:t>논문 수정 사항 </a:t>
-            </a:r>
-            <a:r>
-              <a:rPr lang="ko-KR" altLang="en-US" dirty="0" smtClean="0"/>
-              <a:t>정리</a:t>
+              <a:t>논문 수정 사항 정리</a:t>
             </a:r>
             <a:endParaRPr lang="en-US" altLang="ko-KR" dirty="0" smtClean="0"/>
           </a:p>
@@ -3904,7 +3897,7 @@
           </a:prstGeom>
           <a:extLst>
             <a:ext uri="{C572A759-6A51-4108-AA02-DFA0A04FC94B}">
-              <ma14:wrappingTextBoxFlag xmlns:ma14="http://schemas.microsoft.com/office/mac/drawingml/2011/main" xmlns:a14="http://schemas.microsoft.com/office/drawing/2010/main" xmlns:m="http://schemas.openxmlformats.org/officeDocument/2006/math" xmlns="" val="1"/>
+              <ma14:wrappingTextBoxFlag xmlns="" xmlns:m="http://schemas.openxmlformats.org/officeDocument/2006/math" xmlns:a14="http://schemas.microsoft.com/office/drawing/2010/main" xmlns:ma14="http://schemas.microsoft.com/office/mac/drawingml/2011/main" val="1"/>
             </a:ext>
           </a:extLst>
         </p:spPr>
@@ -4042,11 +4035,7 @@
             </a:pPr>
             <a:r>
               <a:rPr lang="ko-KR" altLang="en-US" dirty="0" smtClean="0"/>
-              <a:t>논문 수정 사항 </a:t>
-            </a:r>
-            <a:r>
-              <a:rPr lang="ko-KR" altLang="en-US" dirty="0" smtClean="0"/>
-              <a:t>정리</a:t>
+              <a:t>논문 수정 사항 정리</a:t>
             </a:r>
             <a:endParaRPr lang="en-US" altLang="ko-KR" dirty="0" smtClean="0"/>
           </a:p>
@@ -4115,11 +4104,6 @@
               </a:rPr>
               <a:t>)</a:t>
             </a:r>
-            <a:endParaRPr lang="en-US" altLang="ko-KR" dirty="0" smtClean="0">
-              <a:solidFill>
-                <a:srgbClr val="0000FF"/>
-              </a:solidFill>
-            </a:endParaRPr>
           </a:p>
         </p:txBody>
       </p:sp>
@@ -4139,7 +4123,7 @@
           </a:prstGeom>
           <a:extLst>
             <a:ext uri="{C572A759-6A51-4108-AA02-DFA0A04FC94B}">
-              <ma14:wrappingTextBoxFlag xmlns:ma14="http://schemas.microsoft.com/office/mac/drawingml/2011/main" xmlns:a14="http://schemas.microsoft.com/office/drawing/2010/main" xmlns:m="http://schemas.openxmlformats.org/officeDocument/2006/math" xmlns="" val="1"/>
+              <ma14:wrappingTextBoxFlag xmlns="" xmlns:m="http://schemas.openxmlformats.org/officeDocument/2006/math" xmlns:a14="http://schemas.microsoft.com/office/drawing/2010/main" xmlns:ma14="http://schemas.microsoft.com/office/mac/drawingml/2011/main" val="1"/>
             </a:ext>
           </a:extLst>
         </p:spPr>
@@ -4603,11 +4587,7 @@
             </a:pPr>
             <a:r>
               <a:rPr lang="ko-KR" altLang="en-US" dirty="0" smtClean="0"/>
-              <a:t>논문 수정 사항 </a:t>
-            </a:r>
-            <a:r>
-              <a:rPr lang="ko-KR" altLang="en-US" dirty="0" smtClean="0"/>
-              <a:t>정리</a:t>
+              <a:t>논문 수정 사항 정리</a:t>
             </a:r>
             <a:endParaRPr lang="en-US" altLang="ko-KR" dirty="0" smtClean="0"/>
           </a:p>
@@ -4676,11 +4656,6 @@
               </a:rPr>
               <a:t>)</a:t>
             </a:r>
-            <a:endParaRPr lang="en-US" altLang="ko-KR" dirty="0" smtClean="0">
-              <a:solidFill>
-                <a:srgbClr val="0000FF"/>
-              </a:solidFill>
-            </a:endParaRPr>
           </a:p>
         </p:txBody>
       </p:sp>
@@ -4700,7 +4675,7 @@
           </a:prstGeom>
           <a:extLst>
             <a:ext uri="{C572A759-6A51-4108-AA02-DFA0A04FC94B}">
-              <ma14:wrappingTextBoxFlag xmlns:ma14="http://schemas.microsoft.com/office/mac/drawingml/2011/main" xmlns:a14="http://schemas.microsoft.com/office/drawing/2010/main" xmlns:m="http://schemas.openxmlformats.org/officeDocument/2006/math" xmlns="" val="1"/>
+              <ma14:wrappingTextBoxFlag xmlns="" xmlns:m="http://schemas.openxmlformats.org/officeDocument/2006/math" xmlns:a14="http://schemas.microsoft.com/office/drawing/2010/main" xmlns:ma14="http://schemas.microsoft.com/office/mac/drawingml/2011/main" val="1"/>
             </a:ext>
           </a:extLst>
         </p:spPr>
@@ -4931,7 +4906,7 @@
         <p:spPr>
           <a:xfrm>
             <a:off x="673100" y="1567280"/>
-            <a:ext cx="11545404" cy="1706007"/>
+            <a:ext cx="11545404" cy="2050563"/>
           </a:xfrm>
           <a:prstGeom prst="rect">
             <a:avLst/>
@@ -4953,11 +4928,7 @@
             </a:pPr>
             <a:r>
               <a:rPr lang="ko-KR" altLang="en-US" dirty="0" smtClean="0"/>
-              <a:t>논문 수정 사항 </a:t>
-            </a:r>
-            <a:r>
-              <a:rPr lang="ko-KR" altLang="en-US" dirty="0" smtClean="0"/>
-              <a:t>정리</a:t>
+              <a:t>논문 수정 사항 정리</a:t>
             </a:r>
             <a:endParaRPr lang="en-US" altLang="ko-KR" dirty="0" smtClean="0"/>
           </a:p>
@@ -4972,7 +4943,15 @@
             </a:pPr>
             <a:r>
               <a:rPr lang="ko-KR" altLang="en-US" dirty="0" smtClean="0"/>
-              <a:t>그 외</a:t>
+              <a:t>결과 비교용 </a:t>
+            </a:r>
+            <a:r>
+              <a:rPr lang="en-US" altLang="ko-KR" dirty="0" smtClean="0"/>
+              <a:t>bar chart </a:t>
+            </a:r>
+            <a:r>
+              <a:rPr lang="ko-KR" altLang="en-US" dirty="0" smtClean="0"/>
+              <a:t>추가</a:t>
             </a:r>
             <a:endParaRPr lang="en-US" altLang="ko-KR" dirty="0" smtClean="0">
               <a:solidFill>
@@ -4998,7 +4977,7 @@
           </a:prstGeom>
           <a:extLst>
             <a:ext uri="{C572A759-6A51-4108-AA02-DFA0A04FC94B}">
-              <ma14:wrappingTextBoxFlag xmlns:ma14="http://schemas.microsoft.com/office/mac/drawingml/2011/main" xmlns:a14="http://schemas.microsoft.com/office/drawing/2010/main" xmlns:m="http://schemas.openxmlformats.org/officeDocument/2006/math" xmlns="" val="1"/>
+              <ma14:wrappingTextBoxFlag xmlns="" xmlns:m="http://schemas.openxmlformats.org/officeDocument/2006/math" xmlns:a14="http://schemas.microsoft.com/office/drawing/2010/main" xmlns:ma14="http://schemas.microsoft.com/office/mac/drawingml/2011/main" val="1"/>
             </a:ext>
           </a:extLst>
         </p:spPr>
@@ -5015,166 +4994,26 @@
       </p:sp>
       <p:pic>
         <p:nvPicPr>
-          <p:cNvPr id="2" name="Picture 1"/>
-          <p:cNvPicPr>
-            <a:picLocks noChangeAspect="1"/>
-          </p:cNvPicPr>
+          <p:cNvPr id="7" name="Picture 6"/>
+          <p:cNvPicPr/>
           <p:nvPr/>
         </p:nvPicPr>
         <p:blipFill>
-          <a:blip r:embed="rId2"/>
+          <a:blip r:embed="rId2">
+            <a:extLst>
+              <a:ext uri="{28A0092B-C50C-407E-A947-70E740481C1C}">
+                <a14:useLocalDpi xmlns:a14="http://schemas.microsoft.com/office/drawing/2010/main" val="0"/>
+              </a:ext>
+            </a:extLst>
+          </a:blip>
           <a:stretch>
             <a:fillRect/>
           </a:stretch>
         </p:blipFill>
         <p:spPr>
           <a:xfrm>
-            <a:off x="1878431" y="2888917"/>
-            <a:ext cx="9796734" cy="943986"/>
-          </a:xfrm>
-          <a:prstGeom prst="rect">
-            <a:avLst/>
-          </a:prstGeom>
-        </p:spPr>
-      </p:pic>
-      <p:pic>
-        <p:nvPicPr>
-          <p:cNvPr id="4" name="Picture 3"/>
-          <p:cNvPicPr>
-            <a:picLocks noChangeAspect="1"/>
-          </p:cNvPicPr>
-          <p:nvPr/>
-        </p:nvPicPr>
-        <p:blipFill>
-          <a:blip r:embed="rId3"/>
-          <a:stretch>
-            <a:fillRect/>
-          </a:stretch>
-        </p:blipFill>
-        <p:spPr>
-          <a:xfrm>
-            <a:off x="1878431" y="4126234"/>
-            <a:ext cx="9868614" cy="658678"/>
-          </a:xfrm>
-          <a:prstGeom prst="rect">
-            <a:avLst/>
-          </a:prstGeom>
-        </p:spPr>
-      </p:pic>
-      <p:pic>
-        <p:nvPicPr>
-          <p:cNvPr id="5" name="Picture 4"/>
-          <p:cNvPicPr>
-            <a:picLocks noChangeAspect="1"/>
-          </p:cNvPicPr>
-          <p:nvPr/>
-        </p:nvPicPr>
-        <p:blipFill>
-          <a:blip r:embed="rId4"/>
-          <a:stretch>
-            <a:fillRect/>
-          </a:stretch>
-        </p:blipFill>
-        <p:spPr>
-          <a:xfrm>
-            <a:off x="1878431" y="5111801"/>
-            <a:ext cx="9710336" cy="661809"/>
-          </a:xfrm>
-          <a:prstGeom prst="rect">
-            <a:avLst/>
-          </a:prstGeom>
-        </p:spPr>
-      </p:pic>
-      <p:pic>
-        <p:nvPicPr>
-          <p:cNvPr id="6" name="Picture 5"/>
-          <p:cNvPicPr>
-            <a:picLocks noChangeAspect="1"/>
-          </p:cNvPicPr>
-          <p:nvPr/>
-        </p:nvPicPr>
-        <p:blipFill>
-          <a:blip r:embed="rId5"/>
-          <a:stretch>
-            <a:fillRect/>
-          </a:stretch>
-        </p:blipFill>
-        <p:spPr>
-          <a:xfrm>
-            <a:off x="1878431" y="6100499"/>
-            <a:ext cx="4450453" cy="1494313"/>
-          </a:xfrm>
-          <a:prstGeom prst="rect">
-            <a:avLst/>
-          </a:prstGeom>
-        </p:spPr>
-      </p:pic>
-      <p:pic>
-        <p:nvPicPr>
-          <p:cNvPr id="7" name="Picture 6"/>
-          <p:cNvPicPr>
-            <a:picLocks noChangeAspect="1"/>
-          </p:cNvPicPr>
-          <p:nvPr/>
-        </p:nvPicPr>
-        <p:blipFill>
-          <a:blip r:embed="rId6"/>
-          <a:stretch>
-            <a:fillRect/>
-          </a:stretch>
-        </p:blipFill>
-        <p:spPr>
-          <a:xfrm>
-            <a:off x="7023394" y="6233020"/>
-            <a:ext cx="4565373" cy="1229139"/>
-          </a:xfrm>
-          <a:prstGeom prst="rect">
-            <a:avLst/>
-          </a:prstGeom>
-        </p:spPr>
-      </p:pic>
-      <p:pic>
-        <p:nvPicPr>
-          <p:cNvPr id="9" name="Picture 8"/>
-          <p:cNvPicPr>
-            <a:picLocks noChangeAspect="1"/>
-          </p:cNvPicPr>
-          <p:nvPr/>
-        </p:nvPicPr>
-        <p:blipFill>
-          <a:blip r:embed="rId7"/>
-          <a:stretch>
-            <a:fillRect/>
-          </a:stretch>
-        </p:blipFill>
-        <p:spPr>
-          <a:xfrm>
-            <a:off x="1878431" y="7921701"/>
-            <a:ext cx="4450453" cy="924325"/>
-          </a:xfrm>
-          <a:prstGeom prst="rect">
-            <a:avLst/>
-          </a:prstGeom>
-        </p:spPr>
-      </p:pic>
-      <p:pic>
-        <p:nvPicPr>
-          <p:cNvPr id="10" name="Picture 9"/>
-          <p:cNvPicPr>
-            <a:picLocks noChangeAspect="1"/>
-          </p:cNvPicPr>
-          <p:nvPr/>
-        </p:nvPicPr>
-        <p:blipFill>
-          <a:blip r:embed="rId8"/>
-          <a:stretch>
-            <a:fillRect/>
-          </a:stretch>
-        </p:blipFill>
-        <p:spPr>
-          <a:xfrm>
-            <a:off x="7023394" y="7917988"/>
-            <a:ext cx="4565373" cy="938247"/>
+            <a:off x="1735274" y="3353991"/>
+            <a:ext cx="10137411" cy="4600358"/>
           </a:xfrm>
           <a:prstGeom prst="rect">
             <a:avLst/>
@@ -5184,7 +5023,7 @@
     </p:spTree>
     <p:extLst>
       <p:ext uri="{BB962C8B-B14F-4D97-AF65-F5344CB8AC3E}">
-        <p14:creationId xmlns:p14="http://schemas.microsoft.com/office/powerpoint/2010/main" val="667873601"/>
+        <p14:creationId xmlns:p14="http://schemas.microsoft.com/office/powerpoint/2010/main" val="853821718"/>
       </p:ext>
     </p:extLst>
   </p:cSld>
@@ -5257,15 +5096,17 @@
         </p:nvSpPr>
         <p:spPr>
           <a:xfrm>
-            <a:off x="673100" y="1567279"/>
-            <a:ext cx="12204700" cy="1480721"/>
+            <a:off x="673100" y="1567280"/>
+            <a:ext cx="11545404" cy="1706007"/>
           </a:xfrm>
           <a:prstGeom prst="rect">
             <a:avLst/>
           </a:prstGeom>
         </p:spPr>
         <p:txBody>
-          <a:bodyPr/>
+          <a:bodyPr>
+            <a:normAutofit/>
+          </a:bodyPr>
           <a:lstStyle/>
           <a:p>
             <a:pPr>
@@ -5278,28 +5119,9 @@
             </a:pPr>
             <a:r>
               <a:rPr lang="ko-KR" altLang="en-US" dirty="0" smtClean="0"/>
-              <a:t>실험의 재현성 테스트 </a:t>
-            </a:r>
-            <a:r>
-              <a:rPr lang="en-US" altLang="ko-KR" dirty="0" smtClean="0"/>
-              <a:t>(</a:t>
-            </a:r>
-            <a:r>
-              <a:rPr lang="en-US" altLang="ko-KR" dirty="0" err="1" smtClean="0"/>
-              <a:t>Github</a:t>
-            </a:r>
-            <a:r>
-              <a:rPr lang="en-US" altLang="ko-KR" dirty="0" smtClean="0"/>
-              <a:t> </a:t>
-            </a:r>
-            <a:r>
-              <a:rPr lang="ko-KR" altLang="en-US" dirty="0" smtClean="0"/>
-              <a:t>코드 실행 방법</a:t>
-            </a:r>
-            <a:r>
-              <a:rPr lang="en-US" altLang="ko-KR" dirty="0" smtClean="0"/>
-              <a:t>)</a:t>
-            </a:r>
+              <a:t>논문 수정 사항 정리</a:t>
+            </a:r>
+            <a:endParaRPr lang="en-US" altLang="ko-KR" dirty="0" smtClean="0"/>
           </a:p>
           <a:p>
             <a:pPr lvl="1">
@@ -5311,18 +5133,14 @@
               </a:defRPr>
             </a:pPr>
             <a:r>
-              <a:rPr lang="en-US" dirty="0" smtClean="0"/>
-              <a:t>Deep learning</a:t>
-            </a:r>
-            <a:r>
               <a:rPr lang="ko-KR" altLang="en-US" dirty="0" smtClean="0"/>
-              <a:t>을 이용한 </a:t>
-            </a:r>
-            <a:r>
-              <a:rPr lang="en-US" altLang="ko-KR" dirty="0" smtClean="0"/>
-              <a:t>our methodology</a:t>
-            </a:r>
-            <a:endParaRPr dirty="0"/>
+              <a:t>그 외</a:t>
+            </a:r>
+            <a:endParaRPr lang="en-US" altLang="ko-KR" dirty="0" smtClean="0">
+              <a:solidFill>
+                <a:srgbClr val="0000FF"/>
+              </a:solidFill>
+            </a:endParaRPr>
           </a:p>
         </p:txBody>
       </p:sp>
@@ -5342,7 +5160,7 @@
           </a:prstGeom>
           <a:extLst>
             <a:ext uri="{C572A759-6A51-4108-AA02-DFA0A04FC94B}">
-              <ma14:wrappingTextBoxFlag xmlns:ma14="http://schemas.microsoft.com/office/mac/drawingml/2011/main" xmlns:a14="http://schemas.microsoft.com/office/drawing/2010/main" xmlns:m="http://schemas.openxmlformats.org/officeDocument/2006/math" xmlns="" val="1"/>
+              <ma14:wrappingTextBoxFlag xmlns="" xmlns:m="http://schemas.openxmlformats.org/officeDocument/2006/math" xmlns:a14="http://schemas.microsoft.com/office/drawing/2010/main" xmlns:ma14="http://schemas.microsoft.com/office/mac/drawingml/2011/main" val="1"/>
             </a:ext>
           </a:extLst>
         </p:spPr>
@@ -5373,8 +5191,8 @@
         </p:blipFill>
         <p:spPr>
           <a:xfrm>
-            <a:off x="673100" y="3129379"/>
-            <a:ext cx="5260971" cy="5413866"/>
+            <a:off x="1878431" y="2888917"/>
+            <a:ext cx="9796734" cy="943986"/>
           </a:xfrm>
           <a:prstGeom prst="rect">
             <a:avLst/>
@@ -5383,7 +5201,7 @@
       </p:pic>
       <p:pic>
         <p:nvPicPr>
-          <p:cNvPr id="3" name="Picture 2"/>
+          <p:cNvPr id="4" name="Picture 3"/>
           <p:cNvPicPr>
             <a:picLocks noChangeAspect="1"/>
           </p:cNvPicPr>
@@ -5397,93 +5215,138 @@
         </p:blipFill>
         <p:spPr>
           <a:xfrm>
-            <a:off x="6328884" y="3373437"/>
-            <a:ext cx="5989998" cy="4925749"/>
+            <a:off x="1878431" y="4126234"/>
+            <a:ext cx="9868614" cy="658678"/>
           </a:xfrm>
           <a:prstGeom prst="rect">
             <a:avLst/>
           </a:prstGeom>
         </p:spPr>
       </p:pic>
-      <p:sp>
-        <p:nvSpPr>
-          <p:cNvPr id="7" name="Rectangle 6"/>
-          <p:cNvSpPr/>
+      <p:pic>
+        <p:nvPicPr>
+          <p:cNvPr id="5" name="Picture 4"/>
+          <p:cNvPicPr>
+            <a:picLocks noChangeAspect="1"/>
+          </p:cNvPicPr>
           <p:nvPr/>
-        </p:nvSpPr>
+        </p:nvPicPr>
+        <p:blipFill>
+          <a:blip r:embed="rId4"/>
+          <a:stretch>
+            <a:fillRect/>
+          </a:stretch>
+        </p:blipFill>
         <p:spPr>
           <a:xfrm>
-            <a:off x="1640770" y="7689418"/>
-            <a:ext cx="2176487" cy="293440"/>
+            <a:off x="1878431" y="5111801"/>
+            <a:ext cx="9710336" cy="661809"/>
           </a:xfrm>
           <a:prstGeom prst="rect">
             <a:avLst/>
           </a:prstGeom>
-          <a:noFill/>
-          <a:ln w="38100" cap="flat">
-            <a:solidFill>
-              <a:srgbClr val="FF0000"/>
-            </a:solidFill>
-            <a:miter lim="400000"/>
-          </a:ln>
-          <a:effectLst/>
-          <a:sp3d/>
-        </p:spPr>
-        <p:style>
-          <a:lnRef idx="0">
-            <a:scrgbClr r="0" g="0" b="0"/>
-          </a:lnRef>
-          <a:fillRef idx="0">
-            <a:scrgbClr r="0" g="0" b="0"/>
-          </a:fillRef>
-          <a:effectRef idx="0">
-            <a:scrgbClr r="0" g="0" b="0"/>
-          </a:effectRef>
-          <a:fontRef idx="none"/>
-        </p:style>
-        <p:txBody>
-          <a:bodyPr rot="0" spcFirstLastPara="1" vertOverflow="overflow" horzOverflow="overflow" vert="horz" wrap="square" lIns="50800" tIns="50800" rIns="50800" bIns="50800" numCol="1" spcCol="38100" rtlCol="0" anchor="ctr">
-            <a:spAutoFit/>
-          </a:bodyPr>
-          <a:lstStyle/>
-          <a:p>
-            <a:pPr marL="0" marR="0" indent="0" algn="ctr" defTabSz="584200" rtl="0" fontAlgn="auto" latinLnBrk="0" hangingPunct="0">
-              <a:lnSpc>
-                <a:spcPct val="100000"/>
-              </a:lnSpc>
-              <a:spcBef>
-                <a:spcPts val="0"/>
-              </a:spcBef>
-              <a:spcAft>
-                <a:spcPts val="0"/>
-              </a:spcAft>
-              <a:buClrTx/>
-              <a:buSzTx/>
-              <a:buFontTx/>
-              <a:buNone/>
-              <a:tabLst/>
-            </a:pPr>
-            <a:endParaRPr kumimoji="0" lang="ko-KR" altLang="en-US" sz="2200" b="0" i="0" u="none" strike="noStrike" cap="none" spc="0" normalizeH="0" baseline="0">
-              <a:ln>
-                <a:noFill/>
-              </a:ln>
-              <a:solidFill>
-                <a:srgbClr val="FFFFFF"/>
-              </a:solidFill>
-              <a:effectLst/>
-              <a:uFillTx/>
-              <a:latin typeface="+mn-lt"/>
-              <a:ea typeface="+mn-ea"/>
-              <a:cs typeface="+mn-cs"/>
-              <a:sym typeface="Helvetica Neue Medium"/>
-            </a:endParaRPr>
-          </a:p>
-        </p:txBody>
-      </p:sp>
+        </p:spPr>
+      </p:pic>
+      <p:pic>
+        <p:nvPicPr>
+          <p:cNvPr id="6" name="Picture 5"/>
+          <p:cNvPicPr>
+            <a:picLocks noChangeAspect="1"/>
+          </p:cNvPicPr>
+          <p:nvPr/>
+        </p:nvPicPr>
+        <p:blipFill>
+          <a:blip r:embed="rId5"/>
+          <a:stretch>
+            <a:fillRect/>
+          </a:stretch>
+        </p:blipFill>
+        <p:spPr>
+          <a:xfrm>
+            <a:off x="1878431" y="6100499"/>
+            <a:ext cx="4450453" cy="1494313"/>
+          </a:xfrm>
+          <a:prstGeom prst="rect">
+            <a:avLst/>
+          </a:prstGeom>
+        </p:spPr>
+      </p:pic>
+      <p:pic>
+        <p:nvPicPr>
+          <p:cNvPr id="7" name="Picture 6"/>
+          <p:cNvPicPr>
+            <a:picLocks noChangeAspect="1"/>
+          </p:cNvPicPr>
+          <p:nvPr/>
+        </p:nvPicPr>
+        <p:blipFill>
+          <a:blip r:embed="rId6"/>
+          <a:stretch>
+            <a:fillRect/>
+          </a:stretch>
+        </p:blipFill>
+        <p:spPr>
+          <a:xfrm>
+            <a:off x="7023394" y="6233020"/>
+            <a:ext cx="4565373" cy="1229139"/>
+          </a:xfrm>
+          <a:prstGeom prst="rect">
+            <a:avLst/>
+          </a:prstGeom>
+        </p:spPr>
+      </p:pic>
+      <p:pic>
+        <p:nvPicPr>
+          <p:cNvPr id="9" name="Picture 8"/>
+          <p:cNvPicPr>
+            <a:picLocks noChangeAspect="1"/>
+          </p:cNvPicPr>
+          <p:nvPr/>
+        </p:nvPicPr>
+        <p:blipFill>
+          <a:blip r:embed="rId7"/>
+          <a:stretch>
+            <a:fillRect/>
+          </a:stretch>
+        </p:blipFill>
+        <p:spPr>
+          <a:xfrm>
+            <a:off x="1878431" y="7921701"/>
+            <a:ext cx="4450453" cy="924325"/>
+          </a:xfrm>
+          <a:prstGeom prst="rect">
+            <a:avLst/>
+          </a:prstGeom>
+        </p:spPr>
+      </p:pic>
+      <p:pic>
+        <p:nvPicPr>
+          <p:cNvPr id="10" name="Picture 9"/>
+          <p:cNvPicPr>
+            <a:picLocks noChangeAspect="1"/>
+          </p:cNvPicPr>
+          <p:nvPr/>
+        </p:nvPicPr>
+        <p:blipFill>
+          <a:blip r:embed="rId8"/>
+          <a:stretch>
+            <a:fillRect/>
+          </a:stretch>
+        </p:blipFill>
+        <p:spPr>
+          <a:xfrm>
+            <a:off x="7023394" y="7917988"/>
+            <a:ext cx="4565373" cy="938247"/>
+          </a:xfrm>
+          <a:prstGeom prst="rect">
+            <a:avLst/>
+          </a:prstGeom>
+        </p:spPr>
+      </p:pic>
     </p:spTree>
     <p:extLst>
       <p:ext uri="{BB962C8B-B14F-4D97-AF65-F5344CB8AC3E}">
-        <p14:creationId xmlns:p14="http://schemas.microsoft.com/office/powerpoint/2010/main" val="1729270465"/>
+        <p14:creationId xmlns:p14="http://schemas.microsoft.com/office/powerpoint/2010/main" val="667873601"/>
       </p:ext>
     </p:extLst>
   </p:cSld>
@@ -5610,12 +5473,16 @@
               </a:defRPr>
             </a:pPr>
             <a:r>
+              <a:rPr lang="en-US" dirty="0" smtClean="0"/>
+              <a:t>Deep learning</a:t>
+            </a:r>
+            <a:r>
               <a:rPr lang="ko-KR" altLang="en-US" dirty="0" smtClean="0"/>
-              <a:t>원래 논문의</a:t>
+              <a:t>을 이용한 </a:t>
             </a:r>
             <a:r>
               <a:rPr lang="en-US" altLang="ko-KR" dirty="0" smtClean="0"/>
-              <a:t> methodology</a:t>
+              <a:t>our methodology</a:t>
             </a:r>
             <a:endParaRPr dirty="0"/>
           </a:p>
@@ -5637,7 +5504,7 @@
           </a:prstGeom>
           <a:extLst>
             <a:ext uri="{C572A759-6A51-4108-AA02-DFA0A04FC94B}">
-              <ma14:wrappingTextBoxFlag xmlns:ma14="http://schemas.microsoft.com/office/mac/drawingml/2011/main" xmlns:a14="http://schemas.microsoft.com/office/drawing/2010/main" xmlns:m="http://schemas.openxmlformats.org/officeDocument/2006/math" xmlns="" val="1"/>
+              <ma14:wrappingTextBoxFlag xmlns="" xmlns:m="http://schemas.openxmlformats.org/officeDocument/2006/math" xmlns:a14="http://schemas.microsoft.com/office/drawing/2010/main" xmlns:ma14="http://schemas.microsoft.com/office/mac/drawingml/2011/main" val="1"/>
             </a:ext>
           </a:extLst>
         </p:spPr>
@@ -5654,7 +5521,7 @@
       </p:sp>
       <p:pic>
         <p:nvPicPr>
-          <p:cNvPr id="4" name="Picture 3"/>
+          <p:cNvPr id="2" name="Picture 1"/>
           <p:cNvPicPr>
             <a:picLocks noChangeAspect="1"/>
           </p:cNvPicPr>
@@ -5668,8 +5535,8 @@
         </p:blipFill>
         <p:spPr>
           <a:xfrm>
-            <a:off x="673100" y="3224135"/>
-            <a:ext cx="5351780" cy="5382986"/>
+            <a:off x="673100" y="3129379"/>
+            <a:ext cx="5260971" cy="5413866"/>
           </a:xfrm>
           <a:prstGeom prst="rect">
             <a:avLst/>
@@ -5678,7 +5545,7 @@
       </p:pic>
       <p:pic>
         <p:nvPicPr>
-          <p:cNvPr id="5" name="Picture 4"/>
+          <p:cNvPr id="3" name="Picture 2"/>
           <p:cNvPicPr>
             <a:picLocks noChangeAspect="1"/>
           </p:cNvPicPr>
@@ -5692,8 +5559,8 @@
         </p:blipFill>
         <p:spPr>
           <a:xfrm>
-            <a:off x="6169933" y="3048000"/>
-            <a:ext cx="6012769" cy="5735257"/>
+            <a:off x="6328884" y="3373437"/>
+            <a:ext cx="5989998" cy="4925749"/>
           </a:xfrm>
           <a:prstGeom prst="rect">
             <a:avLst/>
@@ -5702,14 +5569,14 @@
       </p:pic>
       <p:sp>
         <p:nvSpPr>
-          <p:cNvPr id="9" name="Rectangle 8"/>
+          <p:cNvPr id="7" name="Rectangle 6"/>
           <p:cNvSpPr/>
           <p:nvPr/>
         </p:nvSpPr>
         <p:spPr>
           <a:xfrm>
-            <a:off x="1611742" y="8360229"/>
-            <a:ext cx="1958771" cy="275920"/>
+            <a:off x="1640770" y="7689418"/>
+            <a:ext cx="2176487" cy="293440"/>
           </a:xfrm>
           <a:prstGeom prst="rect">
             <a:avLst/>
@@ -5778,7 +5645,7 @@
     </p:spTree>
     <p:extLst>
       <p:ext uri="{BB962C8B-B14F-4D97-AF65-F5344CB8AC3E}">
-        <p14:creationId xmlns:p14="http://schemas.microsoft.com/office/powerpoint/2010/main" val="1522174019"/>
+        <p14:creationId xmlns:p14="http://schemas.microsoft.com/office/powerpoint/2010/main" val="1729270465"/>
       </p:ext>
     </p:extLst>
   </p:cSld>
@@ -5852,7 +5719,7 @@
         <p:spPr>
           <a:xfrm>
             <a:off x="673100" y="1567279"/>
-            <a:ext cx="12204700" cy="6486958"/>
+            <a:ext cx="12204700" cy="1480721"/>
           </a:xfrm>
           <a:prstGeom prst="rect">
             <a:avLst/>
@@ -5872,33 +5739,28 @@
             </a:pPr>
             <a:r>
               <a:rPr lang="ko-KR" altLang="en-US" dirty="0" smtClean="0"/>
-              <a:t>재현성 테스트 </a:t>
+              <a:t>실험의 재현성 테스트 </a:t>
+            </a:r>
+            <a:r>
+              <a:rPr lang="en-US" altLang="ko-KR" dirty="0" smtClean="0"/>
+              <a:t>(</a:t>
+            </a:r>
+            <a:r>
+              <a:rPr lang="en-US" altLang="ko-KR" dirty="0" err="1" smtClean="0"/>
+              <a:t>Github</a:t>
+            </a:r>
+            <a:r>
+              <a:rPr lang="en-US" altLang="ko-KR" dirty="0" smtClean="0"/>
+              <a:t> </a:t>
             </a:r>
             <a:r>
               <a:rPr lang="ko-KR" altLang="en-US" dirty="0" smtClean="0"/>
-              <a:t>결과 </a:t>
-            </a:r>
-            <a:r>
-              <a:rPr lang="en-US" altLang="ko-KR" dirty="0" smtClean="0">
-                <a:solidFill>
-                  <a:srgbClr val="0000FF"/>
-                </a:solidFill>
-              </a:rPr>
-              <a:t>(</a:t>
-            </a:r>
-            <a:r>
-              <a:rPr lang="en-US" altLang="ko-KR" dirty="0" smtClean="0">
-                <a:solidFill>
-                  <a:srgbClr val="0000FF"/>
-                </a:solidFill>
-              </a:rPr>
-              <a:t>Our Methodology)</a:t>
-            </a:r>
-            <a:endParaRPr lang="en-US" altLang="ko-KR" dirty="0" smtClean="0">
-              <a:solidFill>
-                <a:srgbClr val="0000FF"/>
-              </a:solidFill>
-            </a:endParaRPr>
+              <a:t>코드 실행 방법</a:t>
+            </a:r>
+            <a:r>
+              <a:rPr lang="en-US" altLang="ko-KR" dirty="0" smtClean="0"/>
+              <a:t>)</a:t>
+            </a:r>
           </a:p>
           <a:p>
             <a:pPr lvl="1">
@@ -5911,83 +5773,11 @@
             </a:pPr>
             <a:r>
               <a:rPr lang="ko-KR" altLang="en-US" dirty="0" smtClean="0"/>
-              <a:t>원래 테스트 결과</a:t>
-            </a:r>
-            <a:endParaRPr lang="en-US" altLang="ko-KR" dirty="0" smtClean="0"/>
-          </a:p>
-          <a:p>
-            <a:pPr lvl="1">
-              <a:defRPr>
-                <a:latin typeface="Helvetica"/>
-                <a:ea typeface="Helvetica"/>
-                <a:cs typeface="Helvetica"/>
-                <a:sym typeface="Helvetica"/>
-              </a:defRPr>
-            </a:pPr>
-            <a:endParaRPr lang="en-US" dirty="0"/>
-          </a:p>
-          <a:p>
-            <a:pPr marL="444500" lvl="1" indent="0">
-              <a:buNone/>
-              <a:defRPr>
-                <a:latin typeface="Helvetica"/>
-                <a:ea typeface="Helvetica"/>
-                <a:cs typeface="Helvetica"/>
-                <a:sym typeface="Helvetica"/>
-              </a:defRPr>
-            </a:pPr>
-            <a:endParaRPr lang="en-US" dirty="0"/>
-          </a:p>
-          <a:p>
-            <a:pPr lvl="1">
-              <a:defRPr>
-                <a:latin typeface="Helvetica"/>
-                <a:ea typeface="Helvetica"/>
-                <a:cs typeface="Helvetica"/>
-                <a:sym typeface="Helvetica"/>
-              </a:defRPr>
-            </a:pPr>
-            <a:r>
-              <a:rPr lang="ko-KR" altLang="en-US" dirty="0" smtClean="0"/>
-              <a:t>재실험 결과</a:t>
-            </a:r>
-            <a:endParaRPr lang="en-US" altLang="ko-KR" dirty="0" smtClean="0"/>
-          </a:p>
-          <a:p>
-            <a:pPr lvl="1">
-              <a:defRPr>
-                <a:latin typeface="Helvetica"/>
-                <a:ea typeface="Helvetica"/>
-                <a:cs typeface="Helvetica"/>
-                <a:sym typeface="Helvetica"/>
-              </a:defRPr>
-            </a:pPr>
-            <a:endParaRPr lang="en-US" dirty="0"/>
-          </a:p>
-          <a:p>
-            <a:pPr marL="444500" lvl="1" indent="0">
-              <a:buNone/>
-              <a:defRPr>
-                <a:latin typeface="Helvetica"/>
-                <a:ea typeface="Helvetica"/>
-                <a:cs typeface="Helvetica"/>
-                <a:sym typeface="Helvetica"/>
-              </a:defRPr>
-            </a:pPr>
-            <a:endParaRPr lang="en-US" dirty="0"/>
-          </a:p>
-          <a:p>
-            <a:pPr lvl="1">
-              <a:defRPr>
-                <a:latin typeface="Helvetica"/>
-                <a:ea typeface="Helvetica"/>
-                <a:cs typeface="Helvetica"/>
-                <a:sym typeface="Helvetica"/>
-              </a:defRPr>
-            </a:pPr>
-            <a:r>
-              <a:rPr lang="ko-KR" altLang="en-US" dirty="0" smtClean="0"/>
-              <a:t>차이</a:t>
+              <a:t>원래 논문의</a:t>
+            </a:r>
+            <a:r>
+              <a:rPr lang="en-US" altLang="ko-KR" dirty="0" smtClean="0"/>
+              <a:t> methodology</a:t>
             </a:r>
             <a:endParaRPr dirty="0"/>
           </a:p>
@@ -6009,7 +5799,7 @@
           </a:prstGeom>
           <a:extLst>
             <a:ext uri="{C572A759-6A51-4108-AA02-DFA0A04FC94B}">
-              <ma14:wrappingTextBoxFlag xmlns:ma14="http://schemas.microsoft.com/office/mac/drawingml/2011/main" xmlns:a14="http://schemas.microsoft.com/office/drawing/2010/main" xmlns:m="http://schemas.openxmlformats.org/officeDocument/2006/math" xmlns="" val="1"/>
+              <ma14:wrappingTextBoxFlag xmlns="" xmlns:m="http://schemas.openxmlformats.org/officeDocument/2006/math" xmlns:a14="http://schemas.microsoft.com/office/drawing/2010/main" xmlns:ma14="http://schemas.microsoft.com/office/mac/drawingml/2011/main" val="1"/>
             </a:ext>
           </a:extLst>
         </p:spPr>
@@ -6026,7 +5816,7 @@
       </p:sp>
       <p:pic>
         <p:nvPicPr>
-          <p:cNvPr id="2" name="Picture 1"/>
+          <p:cNvPr id="4" name="Picture 3"/>
           <p:cNvPicPr>
             <a:picLocks noChangeAspect="1"/>
           </p:cNvPicPr>
@@ -6040,8 +5830,8 @@
         </p:blipFill>
         <p:spPr>
           <a:xfrm>
-            <a:off x="5175477" y="2327106"/>
-            <a:ext cx="5934075" cy="1800225"/>
+            <a:off x="673100" y="3224135"/>
+            <a:ext cx="5351780" cy="5382986"/>
           </a:xfrm>
           <a:prstGeom prst="rect">
             <a:avLst/>
@@ -6050,7 +5840,7 @@
       </p:pic>
       <p:pic>
         <p:nvPicPr>
-          <p:cNvPr id="3" name="Picture 2"/>
+          <p:cNvPr id="5" name="Picture 4"/>
           <p:cNvPicPr>
             <a:picLocks noChangeAspect="1"/>
           </p:cNvPicPr>
@@ -6064,42 +5854,93 @@
         </p:blipFill>
         <p:spPr>
           <a:xfrm>
-            <a:off x="5237389" y="4208710"/>
-            <a:ext cx="5810250" cy="1714500"/>
+            <a:off x="6169933" y="3048000"/>
+            <a:ext cx="6012769" cy="5735257"/>
           </a:xfrm>
           <a:prstGeom prst="rect">
             <a:avLst/>
           </a:prstGeom>
         </p:spPr>
       </p:pic>
-      <p:pic>
-        <p:nvPicPr>
-          <p:cNvPr id="4" name="Picture 3"/>
-          <p:cNvPicPr>
-            <a:picLocks noChangeAspect="1"/>
-          </p:cNvPicPr>
+      <p:sp>
+        <p:nvSpPr>
+          <p:cNvPr id="9" name="Rectangle 8"/>
+          <p:cNvSpPr/>
           <p:nvPr/>
-        </p:nvPicPr>
-        <p:blipFill>
-          <a:blip r:embed="rId4"/>
-          <a:stretch>
-            <a:fillRect/>
-          </a:stretch>
-        </p:blipFill>
+        </p:nvSpPr>
         <p:spPr>
           <a:xfrm>
-            <a:off x="5175477" y="6098806"/>
-            <a:ext cx="5838825" cy="1704975"/>
+            <a:off x="1611742" y="8360229"/>
+            <a:ext cx="1958771" cy="275920"/>
           </a:xfrm>
           <a:prstGeom prst="rect">
             <a:avLst/>
           </a:prstGeom>
-        </p:spPr>
-      </p:pic>
+          <a:noFill/>
+          <a:ln w="38100" cap="flat">
+            <a:solidFill>
+              <a:srgbClr val="FF0000"/>
+            </a:solidFill>
+            <a:miter lim="400000"/>
+          </a:ln>
+          <a:effectLst/>
+          <a:sp3d/>
+        </p:spPr>
+        <p:style>
+          <a:lnRef idx="0">
+            <a:scrgbClr r="0" g="0" b="0"/>
+          </a:lnRef>
+          <a:fillRef idx="0">
+            <a:scrgbClr r="0" g="0" b="0"/>
+          </a:fillRef>
+          <a:effectRef idx="0">
+            <a:scrgbClr r="0" g="0" b="0"/>
+          </a:effectRef>
+          <a:fontRef idx="none"/>
+        </p:style>
+        <p:txBody>
+          <a:bodyPr rot="0" spcFirstLastPara="1" vertOverflow="overflow" horzOverflow="overflow" vert="horz" wrap="square" lIns="50800" tIns="50800" rIns="50800" bIns="50800" numCol="1" spcCol="38100" rtlCol="0" anchor="ctr">
+            <a:spAutoFit/>
+          </a:bodyPr>
+          <a:lstStyle/>
+          <a:p>
+            <a:pPr marL="0" marR="0" indent="0" algn="ctr" defTabSz="584200" rtl="0" fontAlgn="auto" latinLnBrk="0" hangingPunct="0">
+              <a:lnSpc>
+                <a:spcPct val="100000"/>
+              </a:lnSpc>
+              <a:spcBef>
+                <a:spcPts val="0"/>
+              </a:spcBef>
+              <a:spcAft>
+                <a:spcPts val="0"/>
+              </a:spcAft>
+              <a:buClrTx/>
+              <a:buSzTx/>
+              <a:buFontTx/>
+              <a:buNone/>
+              <a:tabLst/>
+            </a:pPr>
+            <a:endParaRPr kumimoji="0" lang="ko-KR" altLang="en-US" sz="2200" b="0" i="0" u="none" strike="noStrike" cap="none" spc="0" normalizeH="0" baseline="0">
+              <a:ln>
+                <a:noFill/>
+              </a:ln>
+              <a:solidFill>
+                <a:srgbClr val="FFFFFF"/>
+              </a:solidFill>
+              <a:effectLst/>
+              <a:uFillTx/>
+              <a:latin typeface="+mn-lt"/>
+              <a:ea typeface="+mn-ea"/>
+              <a:cs typeface="+mn-cs"/>
+              <a:sym typeface="Helvetica Neue Medium"/>
+            </a:endParaRPr>
+          </a:p>
+        </p:txBody>
+      </p:sp>
     </p:spTree>
     <p:extLst>
       <p:ext uri="{BB962C8B-B14F-4D97-AF65-F5344CB8AC3E}">
-        <p14:creationId xmlns:p14="http://schemas.microsoft.com/office/powerpoint/2010/main" val="2792112101"/>
+        <p14:creationId xmlns:p14="http://schemas.microsoft.com/office/powerpoint/2010/main" val="1522174019"/>
       </p:ext>
     </p:extLst>
   </p:cSld>
@@ -6193,11 +6034,7 @@
             </a:pPr>
             <a:r>
               <a:rPr lang="ko-KR" altLang="en-US" dirty="0" smtClean="0"/>
-              <a:t>재현성 테스트 </a:t>
-            </a:r>
-            <a:r>
-              <a:rPr lang="ko-KR" altLang="en-US" dirty="0" smtClean="0"/>
-              <a:t>결과 </a:t>
+              <a:t>재현성 테스트 결과 </a:t>
             </a:r>
             <a:r>
               <a:rPr lang="en-US" altLang="ko-KR" dirty="0" smtClean="0">
@@ -6205,21 +6042,8 @@
                   <a:srgbClr val="0000FF"/>
                 </a:solidFill>
               </a:rPr>
-              <a:t>(</a:t>
-            </a:r>
-            <a:r>
-              <a:rPr lang="en-US" altLang="ko-KR" dirty="0" smtClean="0">
-                <a:solidFill>
-                  <a:srgbClr val="0000FF"/>
-                </a:solidFill>
-              </a:rPr>
-              <a:t>Methodology in Original Paper)</a:t>
-            </a:r>
-            <a:endParaRPr lang="en-US" altLang="ko-KR" dirty="0" smtClean="0">
-              <a:solidFill>
-                <a:srgbClr val="0000FF"/>
-              </a:solidFill>
-            </a:endParaRPr>
+              <a:t>(Our Methodology)</a:t>
+            </a:r>
           </a:p>
           <a:p>
             <a:pPr lvl="1">
@@ -6268,6 +6092,10 @@
                 <a:sym typeface="Helvetica"/>
               </a:defRPr>
             </a:pPr>
+            <a:r>
+              <a:rPr lang="ko-KR" altLang="en-US" dirty="0" smtClean="0"/>
+              <a:t>재실험 결과</a:t>
+            </a:r>
             <a:endParaRPr lang="en-US" altLang="ko-KR" dirty="0" smtClean="0"/>
           </a:p>
           <a:p>
@@ -6279,7 +6107,19 @@
                 <a:sym typeface="Helvetica"/>
               </a:defRPr>
             </a:pPr>
-            <a:endParaRPr lang="en-US" altLang="ko-KR" dirty="0" smtClean="0"/>
+            <a:endParaRPr lang="en-US" dirty="0"/>
+          </a:p>
+          <a:p>
+            <a:pPr marL="444500" lvl="1" indent="0">
+              <a:buNone/>
+              <a:defRPr>
+                <a:latin typeface="Helvetica"/>
+                <a:ea typeface="Helvetica"/>
+                <a:cs typeface="Helvetica"/>
+                <a:sym typeface="Helvetica"/>
+              </a:defRPr>
+            </a:pPr>
+            <a:endParaRPr lang="en-US" dirty="0"/>
           </a:p>
           <a:p>
             <a:pPr lvl="1">
@@ -6292,9 +6132,9 @@
             </a:pPr>
             <a:r>
               <a:rPr lang="ko-KR" altLang="en-US" dirty="0" smtClean="0"/>
-              <a:t>재실험 결과</a:t>
-            </a:r>
-            <a:endParaRPr lang="en-US" altLang="ko-KR" dirty="0" smtClean="0"/>
+              <a:t>차이</a:t>
+            </a:r>
+            <a:endParaRPr dirty="0"/>
           </a:p>
         </p:txBody>
       </p:sp>
@@ -6314,7 +6154,7 @@
           </a:prstGeom>
           <a:extLst>
             <a:ext uri="{C572A759-6A51-4108-AA02-DFA0A04FC94B}">
-              <ma14:wrappingTextBoxFlag xmlns:ma14="http://schemas.microsoft.com/office/mac/drawingml/2011/main" xmlns:a14="http://schemas.microsoft.com/office/drawing/2010/main" xmlns:m="http://schemas.openxmlformats.org/officeDocument/2006/math" xmlns="" val="1"/>
+              <ma14:wrappingTextBoxFlag xmlns="" xmlns:m="http://schemas.openxmlformats.org/officeDocument/2006/math" xmlns:a14="http://schemas.microsoft.com/office/drawing/2010/main" xmlns:ma14="http://schemas.microsoft.com/office/mac/drawingml/2011/main" val="1"/>
             </a:ext>
           </a:extLst>
         </p:spPr>
@@ -6331,7 +6171,7 @@
       </p:sp>
       <p:pic>
         <p:nvPicPr>
-          <p:cNvPr id="5" name="Picture 4"/>
+          <p:cNvPr id="2" name="Picture 1"/>
           <p:cNvPicPr>
             <a:picLocks noChangeAspect="1"/>
           </p:cNvPicPr>
@@ -6345,8 +6185,8 @@
         </p:blipFill>
         <p:spPr>
           <a:xfrm>
-            <a:off x="2775832" y="2932338"/>
-            <a:ext cx="7106103" cy="2151389"/>
+            <a:off x="5175477" y="2327106"/>
+            <a:ext cx="5934075" cy="1800225"/>
           </a:xfrm>
           <a:prstGeom prst="rect">
             <a:avLst/>
@@ -6355,7 +6195,7 @@
       </p:pic>
       <p:pic>
         <p:nvPicPr>
-          <p:cNvPr id="6" name="Picture 5"/>
+          <p:cNvPr id="3" name="Picture 2"/>
           <p:cNvPicPr>
             <a:picLocks noChangeAspect="1"/>
           </p:cNvPicPr>
@@ -6369,8 +6209,32 @@
         </p:blipFill>
         <p:spPr>
           <a:xfrm>
-            <a:off x="2834582" y="6038310"/>
-            <a:ext cx="6988603" cy="2068278"/>
+            <a:off x="5237389" y="4208710"/>
+            <a:ext cx="5810250" cy="1714500"/>
+          </a:xfrm>
+          <a:prstGeom prst="rect">
+            <a:avLst/>
+          </a:prstGeom>
+        </p:spPr>
+      </p:pic>
+      <p:pic>
+        <p:nvPicPr>
+          <p:cNvPr id="4" name="Picture 3"/>
+          <p:cNvPicPr>
+            <a:picLocks noChangeAspect="1"/>
+          </p:cNvPicPr>
+          <p:nvPr/>
+        </p:nvPicPr>
+        <p:blipFill>
+          <a:blip r:embed="rId4"/>
+          <a:stretch>
+            <a:fillRect/>
+          </a:stretch>
+        </p:blipFill>
+        <p:spPr>
+          <a:xfrm>
+            <a:off x="5175477" y="6098806"/>
+            <a:ext cx="5838825" cy="1704975"/>
           </a:xfrm>
           <a:prstGeom prst="rect">
             <a:avLst/>
@@ -6380,7 +6244,7 @@
     </p:spTree>
     <p:extLst>
       <p:ext uri="{BB962C8B-B14F-4D97-AF65-F5344CB8AC3E}">
-        <p14:creationId xmlns:p14="http://schemas.microsoft.com/office/powerpoint/2010/main" val="4291512010"/>
+        <p14:creationId xmlns:p14="http://schemas.microsoft.com/office/powerpoint/2010/main" val="2792112101"/>
       </p:ext>
     </p:extLst>
   </p:cSld>
@@ -6454,7 +6318,7 @@
         <p:spPr>
           <a:xfrm>
             <a:off x="673100" y="1567279"/>
-            <a:ext cx="11339830" cy="6399274"/>
+            <a:ext cx="12204700" cy="6486958"/>
           </a:xfrm>
           <a:prstGeom prst="rect">
             <a:avLst/>
@@ -6473,8 +6337,16 @@
               </a:defRPr>
             </a:pPr>
             <a:r>
-              <a:rPr lang="en-US" dirty="0" smtClean="0"/>
-              <a:t>Future Work</a:t>
+              <a:rPr lang="ko-KR" altLang="en-US" dirty="0" smtClean="0"/>
+              <a:t>재현성 테스트 결과 </a:t>
+            </a:r>
+            <a:r>
+              <a:rPr lang="en-US" altLang="ko-KR" dirty="0" smtClean="0">
+                <a:solidFill>
+                  <a:srgbClr val="0000FF"/>
+                </a:solidFill>
+              </a:rPr>
+              <a:t>(Methodology in Original Paper)</a:t>
             </a:r>
           </a:p>
           <a:p>
@@ -6488,13 +6360,69 @@
             </a:pPr>
             <a:r>
               <a:rPr lang="ko-KR" altLang="en-US" dirty="0" smtClean="0"/>
-              <a:t>논문 양식을 기존 논문에 맞추어 수정</a:t>
-            </a:r>
-            <a:endParaRPr dirty="0">
-              <a:solidFill>
-                <a:srgbClr val="FF0000"/>
-              </a:solidFill>
-            </a:endParaRPr>
+              <a:t>원래 테스트 결과</a:t>
+            </a:r>
+            <a:endParaRPr lang="en-US" altLang="ko-KR" dirty="0" smtClean="0"/>
+          </a:p>
+          <a:p>
+            <a:pPr lvl="1">
+              <a:defRPr>
+                <a:latin typeface="Helvetica"/>
+                <a:ea typeface="Helvetica"/>
+                <a:cs typeface="Helvetica"/>
+                <a:sym typeface="Helvetica"/>
+              </a:defRPr>
+            </a:pPr>
+            <a:endParaRPr lang="en-US" dirty="0"/>
+          </a:p>
+          <a:p>
+            <a:pPr marL="444500" lvl="1" indent="0">
+              <a:buNone/>
+              <a:defRPr>
+                <a:latin typeface="Helvetica"/>
+                <a:ea typeface="Helvetica"/>
+                <a:cs typeface="Helvetica"/>
+                <a:sym typeface="Helvetica"/>
+              </a:defRPr>
+            </a:pPr>
+            <a:endParaRPr lang="en-US" dirty="0"/>
+          </a:p>
+          <a:p>
+            <a:pPr lvl="1">
+              <a:defRPr>
+                <a:latin typeface="Helvetica"/>
+                <a:ea typeface="Helvetica"/>
+                <a:cs typeface="Helvetica"/>
+                <a:sym typeface="Helvetica"/>
+              </a:defRPr>
+            </a:pPr>
+            <a:endParaRPr lang="en-US" altLang="ko-KR" dirty="0" smtClean="0"/>
+          </a:p>
+          <a:p>
+            <a:pPr lvl="1">
+              <a:defRPr>
+                <a:latin typeface="Helvetica"/>
+                <a:ea typeface="Helvetica"/>
+                <a:cs typeface="Helvetica"/>
+                <a:sym typeface="Helvetica"/>
+              </a:defRPr>
+            </a:pPr>
+            <a:endParaRPr lang="en-US" altLang="ko-KR" dirty="0" smtClean="0"/>
+          </a:p>
+          <a:p>
+            <a:pPr lvl="1">
+              <a:defRPr>
+                <a:latin typeface="Helvetica"/>
+                <a:ea typeface="Helvetica"/>
+                <a:cs typeface="Helvetica"/>
+                <a:sym typeface="Helvetica"/>
+              </a:defRPr>
+            </a:pPr>
+            <a:r>
+              <a:rPr lang="ko-KR" altLang="en-US" dirty="0" smtClean="0"/>
+              <a:t>재실험 결과</a:t>
+            </a:r>
+            <a:endParaRPr lang="en-US" altLang="ko-KR" dirty="0" smtClean="0"/>
           </a:p>
         </p:txBody>
       </p:sp>
@@ -6514,7 +6442,7 @@
           </a:prstGeom>
           <a:extLst>
             <a:ext uri="{C572A759-6A51-4108-AA02-DFA0A04FC94B}">
-              <ma14:wrappingTextBoxFlag xmlns:ma14="http://schemas.microsoft.com/office/mac/drawingml/2011/main" xmlns:a14="http://schemas.microsoft.com/office/drawing/2010/main" xmlns:m="http://schemas.openxmlformats.org/officeDocument/2006/math" xmlns="" val="1"/>
+              <ma14:wrappingTextBoxFlag xmlns="" xmlns:m="http://schemas.openxmlformats.org/officeDocument/2006/math" xmlns:a14="http://schemas.microsoft.com/office/drawing/2010/main" xmlns:ma14="http://schemas.microsoft.com/office/mac/drawingml/2011/main" val="1"/>
             </a:ext>
           </a:extLst>
         </p:spPr>
@@ -6529,10 +6457,58 @@
           </a:p>
         </p:txBody>
       </p:sp>
+      <p:pic>
+        <p:nvPicPr>
+          <p:cNvPr id="5" name="Picture 4"/>
+          <p:cNvPicPr>
+            <a:picLocks noChangeAspect="1"/>
+          </p:cNvPicPr>
+          <p:nvPr/>
+        </p:nvPicPr>
+        <p:blipFill>
+          <a:blip r:embed="rId2"/>
+          <a:stretch>
+            <a:fillRect/>
+          </a:stretch>
+        </p:blipFill>
+        <p:spPr>
+          <a:xfrm>
+            <a:off x="2775832" y="2932338"/>
+            <a:ext cx="7106103" cy="2151389"/>
+          </a:xfrm>
+          <a:prstGeom prst="rect">
+            <a:avLst/>
+          </a:prstGeom>
+        </p:spPr>
+      </p:pic>
+      <p:pic>
+        <p:nvPicPr>
+          <p:cNvPr id="6" name="Picture 5"/>
+          <p:cNvPicPr>
+            <a:picLocks noChangeAspect="1"/>
+          </p:cNvPicPr>
+          <p:nvPr/>
+        </p:nvPicPr>
+        <p:blipFill>
+          <a:blip r:embed="rId3"/>
+          <a:stretch>
+            <a:fillRect/>
+          </a:stretch>
+        </p:blipFill>
+        <p:spPr>
+          <a:xfrm>
+            <a:off x="2834582" y="6038310"/>
+            <a:ext cx="6988603" cy="2068278"/>
+          </a:xfrm>
+          <a:prstGeom prst="rect">
+            <a:avLst/>
+          </a:prstGeom>
+        </p:spPr>
+      </p:pic>
     </p:spTree>
     <p:extLst>
       <p:ext uri="{BB962C8B-B14F-4D97-AF65-F5344CB8AC3E}">
-        <p14:creationId xmlns:p14="http://schemas.microsoft.com/office/powerpoint/2010/main" val="2811154034"/>
+        <p14:creationId xmlns:p14="http://schemas.microsoft.com/office/powerpoint/2010/main" val="4291512010"/>
       </p:ext>
     </p:extLst>
   </p:cSld>
@@ -6680,6 +6656,158 @@
       </p:grpSpPr>
       <p:sp>
         <p:nvSpPr>
+          <p:cNvPr id="99" name="Current Status"/>
+          <p:cNvSpPr txBox="1">
+            <a:spLocks noGrp="1"/>
+          </p:cNvSpPr>
+          <p:nvPr>
+            <p:ph type="title"/>
+          </p:nvPr>
+        </p:nvSpPr>
+        <p:spPr>
+          <a:prstGeom prst="rect">
+            <a:avLst/>
+          </a:prstGeom>
+        </p:spPr>
+        <p:txBody>
+          <a:bodyPr/>
+          <a:lstStyle/>
+          <a:p>
+            <a:r>
+              <a:rPr dirty="0"/>
+              <a:t>Current Status</a:t>
+            </a:r>
+          </a:p>
+        </p:txBody>
+      </p:sp>
+      <p:sp>
+        <p:nvSpPr>
+          <p:cNvPr id="100" name="주간 진행 사항…"/>
+          <p:cNvSpPr txBox="1">
+            <a:spLocks noGrp="1"/>
+          </p:cNvSpPr>
+          <p:nvPr>
+            <p:ph type="body" idx="1"/>
+          </p:nvPr>
+        </p:nvSpPr>
+        <p:spPr>
+          <a:xfrm>
+            <a:off x="673100" y="1567279"/>
+            <a:ext cx="11339830" cy="6399274"/>
+          </a:xfrm>
+          <a:prstGeom prst="rect">
+            <a:avLst/>
+          </a:prstGeom>
+        </p:spPr>
+        <p:txBody>
+          <a:bodyPr/>
+          <a:lstStyle/>
+          <a:p>
+            <a:pPr>
+              <a:defRPr>
+                <a:latin typeface="Helvetica"/>
+                <a:ea typeface="Helvetica"/>
+                <a:cs typeface="Helvetica"/>
+                <a:sym typeface="Helvetica"/>
+              </a:defRPr>
+            </a:pPr>
+            <a:r>
+              <a:rPr lang="en-US" dirty="0" smtClean="0"/>
+              <a:t>Future Work</a:t>
+            </a:r>
+          </a:p>
+          <a:p>
+            <a:pPr lvl="1">
+              <a:defRPr>
+                <a:latin typeface="Helvetica"/>
+                <a:ea typeface="Helvetica"/>
+                <a:cs typeface="Helvetica"/>
+                <a:sym typeface="Helvetica"/>
+              </a:defRPr>
+            </a:pPr>
+            <a:r>
+              <a:rPr lang="ko-KR" altLang="en-US" dirty="0" smtClean="0"/>
+              <a:t>논문 양식을 기존 논문에 맞추어 수정</a:t>
+            </a:r>
+            <a:endParaRPr dirty="0">
+              <a:solidFill>
+                <a:srgbClr val="FF0000"/>
+              </a:solidFill>
+            </a:endParaRPr>
+          </a:p>
+        </p:txBody>
+      </p:sp>
+      <p:sp>
+        <p:nvSpPr>
+          <p:cNvPr id="101" name="Slide Number"/>
+          <p:cNvSpPr txBox="1">
+            <a:spLocks noGrp="1"/>
+          </p:cNvSpPr>
+          <p:nvPr>
+            <p:ph type="sldNum" sz="quarter" idx="2"/>
+          </p:nvPr>
+        </p:nvSpPr>
+        <p:spPr>
+          <a:prstGeom prst="rect">
+            <a:avLst/>
+          </a:prstGeom>
+          <a:extLst>
+            <a:ext uri="{C572A759-6A51-4108-AA02-DFA0A04FC94B}">
+              <ma14:wrappingTextBoxFlag xmlns="" xmlns:m="http://schemas.openxmlformats.org/officeDocument/2006/math" xmlns:a14="http://schemas.microsoft.com/office/drawing/2010/main" xmlns:ma14="http://schemas.microsoft.com/office/mac/drawingml/2011/main" val="1"/>
+            </a:ext>
+          </a:extLst>
+        </p:spPr>
+        <p:txBody>
+          <a:bodyPr/>
+          <a:lstStyle/>
+          <a:p>
+            <a:fld id="{86CB4B4D-7CA3-9044-876B-883B54F8677D}" type="slidenum">
+              <a:t>20</a:t>
+            </a:fld>
+            <a:endParaRPr/>
+          </a:p>
+        </p:txBody>
+      </p:sp>
+    </p:spTree>
+    <p:extLst>
+      <p:ext uri="{BB962C8B-B14F-4D97-AF65-F5344CB8AC3E}">
+        <p14:creationId xmlns:p14="http://schemas.microsoft.com/office/powerpoint/2010/main" val="2811154034"/>
+      </p:ext>
+    </p:extLst>
+  </p:cSld>
+  <p:clrMapOvr>
+    <a:masterClrMapping/>
+  </p:clrMapOvr>
+  <p:transition spd="med"/>
+  <p:timing>
+    <p:tnLst>
+      <p:par>
+        <p:cTn id="1" dur="indefinite" restart="never" nodeType="tmRoot"/>
+      </p:par>
+    </p:tnLst>
+  </p:timing>
+</p:sld>
+</file>
+
+<file path=ppt/slides/slide21.xml><?xml version="1.0" encoding="utf-8"?>
+<p:sld xmlns:a="http://schemas.openxmlformats.org/drawingml/2006/main" xmlns:r="http://schemas.openxmlformats.org/officeDocument/2006/relationships" xmlns:p="http://schemas.openxmlformats.org/presentationml/2006/main">
+  <p:cSld>
+    <p:spTree>
+      <p:nvGrpSpPr>
+        <p:cNvPr id="1" name=""/>
+        <p:cNvGrpSpPr/>
+        <p:nvPr/>
+      </p:nvGrpSpPr>
+      <p:grpSpPr>
+        <a:xfrm>
+          <a:off x="0" y="0"/>
+          <a:ext cx="0" cy="0"/>
+          <a:chOff x="0" y="0"/>
+          <a:chExt cx="0" cy="0"/>
+        </a:xfrm>
+      </p:grpSpPr>
+      <p:sp>
+        <p:nvSpPr>
           <p:cNvPr id="107" name="To do"/>
           <p:cNvSpPr txBox="1">
             <a:spLocks noGrp="1"/>
@@ -6750,7 +6878,7 @@
           </a:prstGeom>
           <a:extLst>
             <a:ext uri="{C572A759-6A51-4108-AA02-DFA0A04FC94B}">
-              <ma14:wrappingTextBoxFlag xmlns:ma14="http://schemas.microsoft.com/office/mac/drawingml/2011/main" xmlns:a14="http://schemas.microsoft.com/office/drawing/2010/main" xmlns:m="http://schemas.openxmlformats.org/officeDocument/2006/math" xmlns="" val="1"/>
+              <ma14:wrappingTextBoxFlag xmlns="" xmlns:m="http://schemas.openxmlformats.org/officeDocument/2006/math" xmlns:a14="http://schemas.microsoft.com/office/drawing/2010/main" xmlns:ma14="http://schemas.microsoft.com/office/mac/drawingml/2011/main" val="1"/>
             </a:ext>
           </a:extLst>
         </p:spPr>
@@ -6759,7 +6887,7 @@
           <a:lstStyle/>
           <a:p>
             <a:fld id="{86CB4B4D-7CA3-9044-876B-883B54F8677D}" type="slidenum">
-              <a:t>20</a:t>
+              <a:t>21</a:t>
             </a:fld>
             <a:endParaRPr/>
           </a:p>
@@ -6977,7 +7105,7 @@
           </a:prstGeom>
           <a:extLst>
             <a:ext uri="{C572A759-6A51-4108-AA02-DFA0A04FC94B}">
-              <ma14:wrappingTextBoxFlag xmlns:ma14="http://schemas.microsoft.com/office/mac/drawingml/2011/main" xmlns:a14="http://schemas.microsoft.com/office/drawing/2010/main" xmlns:m="http://schemas.openxmlformats.org/officeDocument/2006/math" xmlns="" val="1"/>
+              <ma14:wrappingTextBoxFlag xmlns="" xmlns:m="http://schemas.openxmlformats.org/officeDocument/2006/math" xmlns:a14="http://schemas.microsoft.com/office/drawing/2010/main" xmlns:ma14="http://schemas.microsoft.com/office/mac/drawingml/2011/main" val="1"/>
             </a:ext>
           </a:extLst>
         </p:spPr>
@@ -7121,7 +7249,7 @@
           </a:prstGeom>
           <a:extLst>
             <a:ext uri="{C572A759-6A51-4108-AA02-DFA0A04FC94B}">
-              <ma14:wrappingTextBoxFlag xmlns:ma14="http://schemas.microsoft.com/office/mac/drawingml/2011/main" xmlns:a14="http://schemas.microsoft.com/office/drawing/2010/main" xmlns:m="http://schemas.openxmlformats.org/officeDocument/2006/math" xmlns="" val="1"/>
+              <ma14:wrappingTextBoxFlag xmlns="" xmlns:m="http://schemas.openxmlformats.org/officeDocument/2006/math" xmlns:a14="http://schemas.microsoft.com/office/drawing/2010/main" xmlns:ma14="http://schemas.microsoft.com/office/mac/drawingml/2011/main" val="1"/>
             </a:ext>
           </a:extLst>
         </p:spPr>
@@ -7465,7 +7593,7 @@
           </a:prstGeom>
           <a:extLst>
             <a:ext uri="{C572A759-6A51-4108-AA02-DFA0A04FC94B}">
-              <ma14:wrappingTextBoxFlag xmlns:ma14="http://schemas.microsoft.com/office/mac/drawingml/2011/main" xmlns:a14="http://schemas.microsoft.com/office/drawing/2010/main" xmlns:m="http://schemas.openxmlformats.org/officeDocument/2006/math" xmlns="" val="1"/>
+              <ma14:wrappingTextBoxFlag xmlns="" xmlns:m="http://schemas.openxmlformats.org/officeDocument/2006/math" xmlns:a14="http://schemas.microsoft.com/office/drawing/2010/main" xmlns:ma14="http://schemas.microsoft.com/office/mac/drawingml/2011/main" val="1"/>
             </a:ext>
           </a:extLst>
         </p:spPr>
@@ -7928,7 +8056,7 @@
           </a:prstGeom>
           <a:extLst>
             <a:ext uri="{C572A759-6A51-4108-AA02-DFA0A04FC94B}">
-              <ma14:wrappingTextBoxFlag xmlns:ma14="http://schemas.microsoft.com/office/mac/drawingml/2011/main" xmlns:a14="http://schemas.microsoft.com/office/drawing/2010/main" xmlns:m="http://schemas.openxmlformats.org/officeDocument/2006/math" xmlns="" val="1"/>
+              <ma14:wrappingTextBoxFlag xmlns="" xmlns:m="http://schemas.openxmlformats.org/officeDocument/2006/math" xmlns:a14="http://schemas.microsoft.com/office/drawing/2010/main" xmlns:ma14="http://schemas.microsoft.com/office/mac/drawingml/2011/main" val="1"/>
             </a:ext>
           </a:extLst>
         </p:spPr>
@@ -8245,7 +8373,7 @@
           </a:prstGeom>
           <a:extLst>
             <a:ext uri="{C572A759-6A51-4108-AA02-DFA0A04FC94B}">
-              <ma14:wrappingTextBoxFlag xmlns:ma14="http://schemas.microsoft.com/office/mac/drawingml/2011/main" xmlns:a14="http://schemas.microsoft.com/office/drawing/2010/main" xmlns:m="http://schemas.openxmlformats.org/officeDocument/2006/math" xmlns="" val="1"/>
+              <ma14:wrappingTextBoxFlag xmlns="" xmlns:m="http://schemas.openxmlformats.org/officeDocument/2006/math" xmlns:a14="http://schemas.microsoft.com/office/drawing/2010/main" xmlns:ma14="http://schemas.microsoft.com/office/mac/drawingml/2011/main" val="1"/>
             </a:ext>
           </a:extLst>
         </p:spPr>
@@ -8480,11 +8608,7 @@
             </a:pPr>
             <a:r>
               <a:rPr lang="ko-KR" altLang="en-US" dirty="0" smtClean="0"/>
-              <a:t>논문 수정 사항 </a:t>
-            </a:r>
-            <a:r>
-              <a:rPr lang="ko-KR" altLang="en-US" dirty="0" smtClean="0"/>
-              <a:t>정리</a:t>
+              <a:t>논문 수정 사항 정리</a:t>
             </a:r>
             <a:endParaRPr lang="en-US" altLang="ko-KR" dirty="0" smtClean="0"/>
           </a:p>
@@ -8589,7 +8713,7 @@
           </a:prstGeom>
           <a:extLst>
             <a:ext uri="{C572A759-6A51-4108-AA02-DFA0A04FC94B}">
-              <ma14:wrappingTextBoxFlag xmlns:ma14="http://schemas.microsoft.com/office/mac/drawingml/2011/main" xmlns:a14="http://schemas.microsoft.com/office/drawing/2010/main" xmlns:m="http://schemas.openxmlformats.org/officeDocument/2006/math" xmlns="" val="1"/>
+              <ma14:wrappingTextBoxFlag xmlns="" xmlns:m="http://schemas.openxmlformats.org/officeDocument/2006/math" xmlns:a14="http://schemas.microsoft.com/office/drawing/2010/main" xmlns:ma14="http://schemas.microsoft.com/office/mac/drawingml/2011/main" val="1"/>
             </a:ext>
           </a:extLst>
         </p:spPr>
@@ -8727,11 +8851,7 @@
             </a:pPr>
             <a:r>
               <a:rPr lang="ko-KR" altLang="en-US" dirty="0" smtClean="0"/>
-              <a:t>논문 수정 사항 </a:t>
-            </a:r>
-            <a:r>
-              <a:rPr lang="ko-KR" altLang="en-US" dirty="0" smtClean="0"/>
-              <a:t>정리</a:t>
+              <a:t>논문 수정 사항 정리</a:t>
             </a:r>
             <a:endParaRPr lang="en-US" altLang="ko-KR" dirty="0" smtClean="0"/>
           </a:p>
@@ -8839,7 +8959,7 @@
           </a:prstGeom>
           <a:extLst>
             <a:ext uri="{C572A759-6A51-4108-AA02-DFA0A04FC94B}">
-              <ma14:wrappingTextBoxFlag xmlns:ma14="http://schemas.microsoft.com/office/mac/drawingml/2011/main" xmlns:a14="http://schemas.microsoft.com/office/drawing/2010/main" xmlns:m="http://schemas.openxmlformats.org/officeDocument/2006/math" xmlns="" val="1"/>
+              <ma14:wrappingTextBoxFlag xmlns="" xmlns:m="http://schemas.openxmlformats.org/officeDocument/2006/math" xmlns:a14="http://schemas.microsoft.com/office/drawing/2010/main" xmlns:ma14="http://schemas.microsoft.com/office/mac/drawingml/2011/main" val="1"/>
             </a:ext>
           </a:extLst>
         </p:spPr>

</xml_diff>